<commit_message>
Upgraded the results with hyperparameter tuning
Upgraded the results with hyperparameter tuning
</commit_message>
<xml_diff>
--- a/Big Data Final Presentation.pptx
+++ b/Big Data Final Presentation.pptx
@@ -12263,7 +12263,7 @@
               <a:rPr lang="en-US" sz="2800" dirty="0">
                 <a:sym typeface="Wingdings" panose="05000000000000000000" pitchFamily="2" charset="2"/>
               </a:rPr>
-              <a:t> 0.77</a:t>
+              <a:t> 0.78</a:t>
             </a:r>
             <a:r>
               <a:rPr lang="en-US" sz="2800" dirty="0"/>
@@ -12300,7 +12300,7 @@
               <a:rPr lang="en-US" sz="2800" dirty="0">
                 <a:sym typeface="Wingdings" panose="05000000000000000000" pitchFamily="2" charset="2"/>
               </a:rPr>
-              <a:t>Random Forest recall for class = 1  0.84</a:t>
+              <a:t>Random Forest recall for class = 1  0.91</a:t>
             </a:r>
             <a:endParaRPr lang="en-US" sz="2800" dirty="0"/>
           </a:p>

</xml_diff>